<commit_message>
Clarify -->* vs `eval`
</commit_message>
<xml_diff>
--- a/17-subst-model/lec.pptx
+++ b/17-subst-model/lec.pptx
@@ -229,7 +229,7 @@
           <a:p>
             <a:fld id="{5367F125-181F-9A48-A24E-AAD89CB055B5}" type="datetimeFigureOut">
               <a:rPr lang="en-US" smtClean="0"/>
-              <a:t>10/31/19</a:t>
+              <a:t>11/2/19</a:t>
             </a:fld>
             <a:endParaRPr lang="en-US"/>
           </a:p>
@@ -2173,7 +2173,7 @@
           <a:p>
             <a:fld id="{96331252-4874-F047-84B8-3D3EF8743E79}" type="datetimeFigureOut">
               <a:rPr lang="en-US" smtClean="0"/>
-              <a:t>10/31/19</a:t>
+              <a:t>11/2/19</a:t>
             </a:fld>
             <a:endParaRPr lang="en-US"/>
           </a:p>
@@ -2440,7 +2440,7 @@
           <a:p>
             <a:fld id="{96331252-4874-F047-84B8-3D3EF8743E79}" type="datetimeFigureOut">
               <a:rPr lang="en-US" smtClean="0"/>
-              <a:t>10/31/19</a:t>
+              <a:t>11/2/19</a:t>
             </a:fld>
             <a:endParaRPr lang="en-US"/>
           </a:p>
@@ -2618,7 +2618,7 @@
           <a:p>
             <a:fld id="{96331252-4874-F047-84B8-3D3EF8743E79}" type="datetimeFigureOut">
               <a:rPr lang="en-US" smtClean="0"/>
-              <a:t>10/31/19</a:t>
+              <a:t>11/2/19</a:t>
             </a:fld>
             <a:endParaRPr lang="en-US"/>
           </a:p>
@@ -2786,7 +2786,7 @@
           <a:p>
             <a:fld id="{96331252-4874-F047-84B8-3D3EF8743E79}" type="datetimeFigureOut">
               <a:rPr lang="en-US" smtClean="0"/>
-              <a:t>10/31/19</a:t>
+              <a:t>11/2/19</a:t>
             </a:fld>
             <a:endParaRPr lang="en-US"/>
           </a:p>
@@ -3035,7 +3035,7 @@
           <a:p>
             <a:fld id="{96331252-4874-F047-84B8-3D3EF8743E79}" type="datetimeFigureOut">
               <a:rPr lang="en-US" smtClean="0"/>
-              <a:t>10/31/19</a:t>
+              <a:t>11/2/19</a:t>
             </a:fld>
             <a:endParaRPr lang="en-US"/>
           </a:p>
@@ -3320,7 +3320,7 @@
           <a:p>
             <a:fld id="{96331252-4874-F047-84B8-3D3EF8743E79}" type="datetimeFigureOut">
               <a:rPr lang="en-US" smtClean="0"/>
-              <a:t>10/31/19</a:t>
+              <a:t>11/2/19</a:t>
             </a:fld>
             <a:endParaRPr lang="en-US"/>
           </a:p>
@@ -3739,7 +3739,7 @@
           <a:p>
             <a:fld id="{96331252-4874-F047-84B8-3D3EF8743E79}" type="datetimeFigureOut">
               <a:rPr lang="en-US" smtClean="0"/>
-              <a:t>10/31/19</a:t>
+              <a:t>11/2/19</a:t>
             </a:fld>
             <a:endParaRPr lang="en-US"/>
           </a:p>
@@ -3856,7 +3856,7 @@
           <a:p>
             <a:fld id="{96331252-4874-F047-84B8-3D3EF8743E79}" type="datetimeFigureOut">
               <a:rPr lang="en-US" smtClean="0"/>
-              <a:t>10/31/19</a:t>
+              <a:t>11/2/19</a:t>
             </a:fld>
             <a:endParaRPr lang="en-US"/>
           </a:p>
@@ -3951,7 +3951,7 @@
           <a:p>
             <a:fld id="{96331252-4874-F047-84B8-3D3EF8743E79}" type="datetimeFigureOut">
               <a:rPr lang="en-US" smtClean="0"/>
-              <a:t>10/31/19</a:t>
+              <a:t>11/2/19</a:t>
             </a:fld>
             <a:endParaRPr lang="en-US"/>
           </a:p>
@@ -4226,7 +4226,7 @@
           <a:p>
             <a:fld id="{96331252-4874-F047-84B8-3D3EF8743E79}" type="datetimeFigureOut">
               <a:rPr lang="en-US" smtClean="0"/>
-              <a:t>10/31/19</a:t>
+              <a:t>11/2/19</a:t>
             </a:fld>
             <a:endParaRPr lang="en-US"/>
           </a:p>
@@ -4478,7 +4478,7 @@
           <a:p>
             <a:fld id="{96331252-4874-F047-84B8-3D3EF8743E79}" type="datetimeFigureOut">
               <a:rPr lang="en-US" smtClean="0"/>
-              <a:t>10/31/19</a:t>
+              <a:t>11/2/19</a:t>
             </a:fld>
             <a:endParaRPr lang="en-US"/>
           </a:p>
@@ -4692,7 +4692,7 @@
             <a:fld id="{96331252-4874-F047-84B8-3D3EF8743E79}" type="datetimeFigureOut">
               <a:rPr lang="en-US" smtClean="0"/>
               <a:pPr/>
-              <a:t>10/31/19</a:t>
+              <a:t>11/2/19</a:t>
             </a:fld>
             <a:endParaRPr lang="en-US"/>
           </a:p>
@@ -5293,8 +5293,8 @@
         </p:nvSpPr>
         <p:spPr>
           <a:xfrm>
-            <a:off x="2850213" y="6056807"/>
-            <a:ext cx="3443571" cy="369332"/>
+            <a:off x="2392556" y="6042952"/>
+            <a:ext cx="4358886" cy="369332"/>
           </a:xfrm>
           <a:prstGeom prst="rect">
             <a:avLst/>
@@ -5310,7 +5310,7 @@
               <a:rPr lang="en-US" dirty="0">
                 <a:latin typeface="Cronos Pro" panose="020C0502030403020304" pitchFamily="34" charset="77"/>
               </a:rPr>
-              <a:t>the </a:t>
+              <a:t>related to the </a:t>
             </a:r>
             <a:r>
               <a:rPr lang="en-US" dirty="0" err="1">

</xml_diff>